<commit_message>
slide com a ordem certa
</commit_message>
<xml_diff>
--- a/Slides/Apresentação.pptx
+++ b/Slides/Apresentação.pptx
@@ -14,9 +14,9 @@
     <p:sldId id="267" r:id="rId8"/>
     <p:sldId id="268" r:id="rId9"/>
     <p:sldId id="269" r:id="rId10"/>
-    <p:sldId id="270" r:id="rId11"/>
-    <p:sldId id="271" r:id="rId12"/>
-    <p:sldId id="273" r:id="rId13"/>
+    <p:sldId id="271" r:id="rId11"/>
+    <p:sldId id="273" r:id="rId12"/>
+    <p:sldId id="270" r:id="rId13"/>
     <p:sldId id="272" r:id="rId14"/>
   </p:sldIdLst>
   <p:sldSz cx="12192000" cy="6858000"/>
@@ -5655,6 +5655,547 @@
       </p:grpSpPr>
       <p:sp>
         <p:nvSpPr>
+          <p:cNvPr id="2" name="Título 1">
+            <a:extLst>
+              <a:ext uri="{FF2B5EF4-FFF2-40B4-BE49-F238E27FC236}">
+                <a16:creationId xmlns:a16="http://schemas.microsoft.com/office/drawing/2014/main" id="{83A4A13A-E62D-45BB-9F17-EBB438D6531F}"/>
+              </a:ext>
+            </a:extLst>
+          </p:cNvPr>
+          <p:cNvSpPr>
+            <a:spLocks noGrp="1"/>
+          </p:cNvSpPr>
+          <p:nvPr>
+            <p:ph type="title" idx="4294967295"/>
+          </p:nvPr>
+        </p:nvSpPr>
+        <p:spPr>
+          <a:xfrm>
+            <a:off x="1012031" y="516603"/>
+            <a:ext cx="10167937" cy="1179513"/>
+          </a:xfrm>
+        </p:spPr>
+        <p:txBody>
+          <a:bodyPr/>
+          <a:lstStyle/>
+          <a:p>
+            <a:r>
+              <a:rPr lang="pt-BR" dirty="0">
+                <a:solidFill>
+                  <a:srgbClr val="363636"/>
+                </a:solidFill>
+              </a:rPr>
+              <a:t>Analytics (Rins)</a:t>
+            </a:r>
+          </a:p>
+        </p:txBody>
+      </p:sp>
+      <p:sp>
+        <p:nvSpPr>
+          <p:cNvPr id="4" name="Retângulo 3">
+            <a:extLst>
+              <a:ext uri="{FF2B5EF4-FFF2-40B4-BE49-F238E27FC236}">
+                <a16:creationId xmlns:a16="http://schemas.microsoft.com/office/drawing/2014/main" id="{FFCF9295-937A-4B33-A4CB-5DB7B6A7A527}"/>
+              </a:ext>
+            </a:extLst>
+          </p:cNvPr>
+          <p:cNvSpPr/>
+          <p:nvPr/>
+        </p:nvSpPr>
+        <p:spPr>
+          <a:xfrm>
+            <a:off x="2281650" y="2559596"/>
+            <a:ext cx="2473452" cy="628650"/>
+          </a:xfrm>
+          <a:prstGeom prst="rect">
+            <a:avLst/>
+          </a:prstGeom>
+          <a:solidFill>
+            <a:schemeClr val="accent4">
+              <a:lumMod val="75000"/>
+            </a:schemeClr>
+          </a:solidFill>
+          <a:ln>
+            <a:solidFill>
+              <a:srgbClr val="363636"/>
+            </a:solidFill>
+          </a:ln>
+        </p:spPr>
+        <p:style>
+          <a:lnRef idx="2">
+            <a:schemeClr val="accent1">
+              <a:shade val="50000"/>
+            </a:schemeClr>
+          </a:lnRef>
+          <a:fillRef idx="1">
+            <a:schemeClr val="accent1"/>
+          </a:fillRef>
+          <a:effectRef idx="0">
+            <a:schemeClr val="accent1"/>
+          </a:effectRef>
+          <a:fontRef idx="minor">
+            <a:schemeClr val="lt1"/>
+          </a:fontRef>
+        </p:style>
+        <p:txBody>
+          <a:bodyPr rtlCol="0" anchor="ctr"/>
+          <a:lstStyle/>
+          <a:p>
+            <a:pPr algn="ctr"/>
+            <a:r>
+              <a:rPr lang="pt-BR" sz="2400" b="1" dirty="0">
+                <a:solidFill>
+                  <a:schemeClr val="tx2"/>
+                </a:solidFill>
+              </a:rPr>
+              <a:t>Crítico</a:t>
+            </a:r>
+          </a:p>
+        </p:txBody>
+      </p:sp>
+      <p:sp>
+        <p:nvSpPr>
+          <p:cNvPr id="6" name="Retângulo 5">
+            <a:extLst>
+              <a:ext uri="{FF2B5EF4-FFF2-40B4-BE49-F238E27FC236}">
+                <a16:creationId xmlns:a16="http://schemas.microsoft.com/office/drawing/2014/main" id="{42DE3707-45C7-4B26-BBC1-B6AD526682F9}"/>
+              </a:ext>
+            </a:extLst>
+          </p:cNvPr>
+          <p:cNvSpPr/>
+          <p:nvPr/>
+        </p:nvSpPr>
+        <p:spPr>
+          <a:xfrm>
+            <a:off x="4755102" y="2559596"/>
+            <a:ext cx="2473452" cy="628650"/>
+          </a:xfrm>
+          <a:prstGeom prst="rect">
+            <a:avLst/>
+          </a:prstGeom>
+          <a:solidFill>
+            <a:srgbClr val="FFFF00"/>
+          </a:solidFill>
+          <a:ln>
+            <a:solidFill>
+              <a:srgbClr val="363636"/>
+            </a:solidFill>
+          </a:ln>
+        </p:spPr>
+        <p:style>
+          <a:lnRef idx="2">
+            <a:schemeClr val="accent1">
+              <a:shade val="50000"/>
+            </a:schemeClr>
+          </a:lnRef>
+          <a:fillRef idx="1">
+            <a:schemeClr val="accent1"/>
+          </a:fillRef>
+          <a:effectRef idx="0">
+            <a:schemeClr val="accent1"/>
+          </a:effectRef>
+          <a:fontRef idx="minor">
+            <a:schemeClr val="lt1"/>
+          </a:fontRef>
+        </p:style>
+        <p:txBody>
+          <a:bodyPr rtlCol="0" anchor="ctr"/>
+          <a:lstStyle/>
+          <a:p>
+            <a:pPr algn="ctr"/>
+            <a:r>
+              <a:rPr lang="pt-BR" sz="2400" b="1" dirty="0">
+                <a:solidFill>
+                  <a:schemeClr val="tx2"/>
+                </a:solidFill>
+              </a:rPr>
+              <a:t>Alerta</a:t>
+            </a:r>
+          </a:p>
+        </p:txBody>
+      </p:sp>
+      <p:sp>
+        <p:nvSpPr>
+          <p:cNvPr id="8" name="Retângulo 7">
+            <a:extLst>
+              <a:ext uri="{FF2B5EF4-FFF2-40B4-BE49-F238E27FC236}">
+                <a16:creationId xmlns:a16="http://schemas.microsoft.com/office/drawing/2014/main" id="{534753E8-DC08-4D85-8E76-1DD10976FC2F}"/>
+              </a:ext>
+            </a:extLst>
+          </p:cNvPr>
+          <p:cNvSpPr/>
+          <p:nvPr/>
+        </p:nvSpPr>
+        <p:spPr>
+          <a:xfrm>
+            <a:off x="7228554" y="2559596"/>
+            <a:ext cx="2473452" cy="628650"/>
+          </a:xfrm>
+          <a:prstGeom prst="rect">
+            <a:avLst/>
+          </a:prstGeom>
+          <a:solidFill>
+            <a:srgbClr val="92D050"/>
+          </a:solidFill>
+          <a:ln>
+            <a:solidFill>
+              <a:srgbClr val="363636"/>
+            </a:solidFill>
+          </a:ln>
+        </p:spPr>
+        <p:style>
+          <a:lnRef idx="2">
+            <a:schemeClr val="accent1">
+              <a:shade val="50000"/>
+            </a:schemeClr>
+          </a:lnRef>
+          <a:fillRef idx="1">
+            <a:schemeClr val="accent1"/>
+          </a:fillRef>
+          <a:effectRef idx="0">
+            <a:schemeClr val="accent1"/>
+          </a:effectRef>
+          <a:fontRef idx="minor">
+            <a:schemeClr val="lt1"/>
+          </a:fontRef>
+        </p:style>
+        <p:txBody>
+          <a:bodyPr rtlCol="0" anchor="ctr"/>
+          <a:lstStyle/>
+          <a:p>
+            <a:pPr algn="ctr"/>
+            <a:r>
+              <a:rPr lang="pt-BR" sz="2400" b="1" dirty="0">
+                <a:solidFill>
+                  <a:schemeClr val="tx2"/>
+                </a:solidFill>
+              </a:rPr>
+              <a:t>Ideal</a:t>
+            </a:r>
+          </a:p>
+        </p:txBody>
+      </p:sp>
+      <p:sp>
+        <p:nvSpPr>
+          <p:cNvPr id="9" name="CaixaDeTexto 8">
+            <a:extLst>
+              <a:ext uri="{FF2B5EF4-FFF2-40B4-BE49-F238E27FC236}">
+                <a16:creationId xmlns:a16="http://schemas.microsoft.com/office/drawing/2014/main" id="{33B73398-4E20-4CFE-81A3-DA32E33E0BB7}"/>
+              </a:ext>
+            </a:extLst>
+          </p:cNvPr>
+          <p:cNvSpPr txBox="1"/>
+          <p:nvPr/>
+        </p:nvSpPr>
+        <p:spPr>
+          <a:xfrm>
+            <a:off x="2281650" y="3188246"/>
+            <a:ext cx="2473452" cy="1815882"/>
+          </a:xfrm>
+          <a:prstGeom prst="rect">
+            <a:avLst/>
+          </a:prstGeom>
+          <a:noFill/>
+        </p:spPr>
+        <p:txBody>
+          <a:bodyPr wrap="square" rtlCol="0">
+            <a:spAutoFit/>
+          </a:bodyPr>
+          <a:lstStyle/>
+          <a:p>
+            <a:pPr marL="285750" indent="-285750">
+              <a:buFont typeface="Arial" panose="020B0604020202020204" pitchFamily="34" charset="0"/>
+              <a:buChar char="•"/>
+            </a:pPr>
+            <a:r>
+              <a:rPr lang="pt-BR" sz="1600" dirty="0">
+                <a:solidFill>
+                  <a:schemeClr val="tx2"/>
+                </a:solidFill>
+              </a:rPr>
+              <a:t>Armazenamento de órgão em risco com perda acelerada da capacidade isotérmica da caixa (temperaturas como 1,5ºC ou 7,4ºC)</a:t>
+            </a:r>
+          </a:p>
+        </p:txBody>
+      </p:sp>
+      <p:sp>
+        <p:nvSpPr>
+          <p:cNvPr id="11" name="CaixaDeTexto 10">
+            <a:extLst>
+              <a:ext uri="{FF2B5EF4-FFF2-40B4-BE49-F238E27FC236}">
+                <a16:creationId xmlns:a16="http://schemas.microsoft.com/office/drawing/2014/main" id="{5E997853-8083-4277-B5EA-6F7F3CAB3191}"/>
+              </a:ext>
+            </a:extLst>
+          </p:cNvPr>
+          <p:cNvSpPr txBox="1"/>
+          <p:nvPr/>
+        </p:nvSpPr>
+        <p:spPr>
+          <a:xfrm>
+            <a:off x="4755102" y="3169136"/>
+            <a:ext cx="2473452" cy="2062103"/>
+          </a:xfrm>
+          <a:prstGeom prst="rect">
+            <a:avLst/>
+          </a:prstGeom>
+          <a:noFill/>
+        </p:spPr>
+        <p:txBody>
+          <a:bodyPr wrap="square" rtlCol="0">
+            <a:spAutoFit/>
+          </a:bodyPr>
+          <a:lstStyle/>
+          <a:p>
+            <a:pPr marL="285750" indent="-285750">
+              <a:buFont typeface="Arial" panose="020B0604020202020204" pitchFamily="34" charset="0"/>
+              <a:buChar char="•"/>
+            </a:pPr>
+            <a:r>
+              <a:rPr lang="pt-BR" sz="1600" dirty="0">
+                <a:solidFill>
+                  <a:schemeClr val="tx2"/>
+                </a:solidFill>
+              </a:rPr>
+              <a:t>Armazenamento de órgão em fase de atenção com risco de perda da capacidade isotérmica da caixa (temperaturas como 2,2ºC ou 5,6ºC)</a:t>
+            </a:r>
+          </a:p>
+        </p:txBody>
+      </p:sp>
+      <p:sp>
+        <p:nvSpPr>
+          <p:cNvPr id="13" name="CaixaDeTexto 12">
+            <a:extLst>
+              <a:ext uri="{FF2B5EF4-FFF2-40B4-BE49-F238E27FC236}">
+                <a16:creationId xmlns:a16="http://schemas.microsoft.com/office/drawing/2014/main" id="{FB2CADAA-0C0B-4B16-A153-F1F523288EAB}"/>
+              </a:ext>
+            </a:extLst>
+          </p:cNvPr>
+          <p:cNvSpPr txBox="1"/>
+          <p:nvPr/>
+        </p:nvSpPr>
+        <p:spPr>
+          <a:xfrm>
+            <a:off x="7228554" y="3169135"/>
+            <a:ext cx="2473452" cy="1815882"/>
+          </a:xfrm>
+          <a:prstGeom prst="rect">
+            <a:avLst/>
+          </a:prstGeom>
+          <a:noFill/>
+        </p:spPr>
+        <p:txBody>
+          <a:bodyPr wrap="square" rtlCol="0">
+            <a:spAutoFit/>
+          </a:bodyPr>
+          <a:lstStyle/>
+          <a:p>
+            <a:pPr marL="285750" indent="-285750">
+              <a:buFont typeface="Arial" panose="020B0604020202020204" pitchFamily="34" charset="0"/>
+              <a:buChar char="•"/>
+            </a:pPr>
+            <a:r>
+              <a:rPr lang="pt-BR" sz="1600" dirty="0">
+                <a:solidFill>
+                  <a:schemeClr val="tx2"/>
+                </a:solidFill>
+              </a:rPr>
+              <a:t>Armazenamento de órgão em fase ideal, sem risco de perda da capacidade isotérmica da caixa, mantendo-se entre 3,5ºC e 4ºC</a:t>
+            </a:r>
+          </a:p>
+        </p:txBody>
+      </p:sp>
+    </p:spTree>
+    <p:extLst>
+      <p:ext uri="{BB962C8B-B14F-4D97-AF65-F5344CB8AC3E}">
+        <p14:creationId xmlns:p14="http://schemas.microsoft.com/office/powerpoint/2010/main" val="2943371185"/>
+      </p:ext>
+    </p:extLst>
+  </p:cSld>
+  <p:clrMapOvr>
+    <a:masterClrMapping/>
+  </p:clrMapOvr>
+</p:sld>
+</file>
+
+<file path=ppt/slides/slide11.xml><?xml version="1.0" encoding="utf-8"?>
+<p:sld xmlns:a="http://schemas.openxmlformats.org/drawingml/2006/main" xmlns:r="http://schemas.openxmlformats.org/officeDocument/2006/relationships" xmlns:p="http://schemas.openxmlformats.org/presentationml/2006/main">
+  <p:cSld>
+    <p:bg>
+      <p:bgPr>
+        <a:solidFill>
+          <a:schemeClr val="bg1"/>
+        </a:solidFill>
+        <a:effectLst/>
+      </p:bgPr>
+    </p:bg>
+    <p:spTree>
+      <p:nvGrpSpPr>
+        <p:cNvPr id="1" name=""/>
+        <p:cNvGrpSpPr/>
+        <p:nvPr/>
+      </p:nvGrpSpPr>
+      <p:grpSpPr>
+        <a:xfrm>
+          <a:off x="0" y="0"/>
+          <a:ext cx="0" cy="0"/>
+          <a:chOff x="0" y="0"/>
+          <a:chExt cx="0" cy="0"/>
+        </a:xfrm>
+      </p:grpSpPr>
+      <p:sp>
+        <p:nvSpPr>
+          <p:cNvPr id="2" name="Título 1">
+            <a:extLst>
+              <a:ext uri="{FF2B5EF4-FFF2-40B4-BE49-F238E27FC236}">
+                <a16:creationId xmlns:a16="http://schemas.microsoft.com/office/drawing/2014/main" id="{83A4A13A-E62D-45BB-9F17-EBB438D6531F}"/>
+              </a:ext>
+            </a:extLst>
+          </p:cNvPr>
+          <p:cNvSpPr>
+            <a:spLocks noGrp="1"/>
+          </p:cNvSpPr>
+          <p:nvPr>
+            <p:ph type="title" idx="4294967295"/>
+          </p:nvPr>
+        </p:nvSpPr>
+        <p:spPr>
+          <a:xfrm>
+            <a:off x="1012031" y="273111"/>
+            <a:ext cx="10167937" cy="1179513"/>
+          </a:xfrm>
+        </p:spPr>
+        <p:txBody>
+          <a:bodyPr/>
+          <a:lstStyle/>
+          <a:p>
+            <a:r>
+              <a:rPr lang="pt-BR" dirty="0">
+                <a:solidFill>
+                  <a:srgbClr val="363636"/>
+                </a:solidFill>
+              </a:rPr>
+              <a:t>Analytics (Rins)</a:t>
+            </a:r>
+          </a:p>
+        </p:txBody>
+      </p:sp>
+      <p:pic>
+        <p:nvPicPr>
+          <p:cNvPr id="3" name="Picture 4">
+            <a:extLst>
+              <a:ext uri="{FF2B5EF4-FFF2-40B4-BE49-F238E27FC236}">
+                <a16:creationId xmlns:a16="http://schemas.microsoft.com/office/drawing/2014/main" id="{AD197701-38AD-42DE-921C-A28C0136A7D0}"/>
+              </a:ext>
+            </a:extLst>
+          </p:cNvPr>
+          <p:cNvPicPr>
+            <a:picLocks noChangeAspect="1" noChangeArrowheads="1"/>
+          </p:cNvPicPr>
+          <p:nvPr/>
+        </p:nvPicPr>
+        <p:blipFill>
+          <a:blip r:embed="rId2">
+            <a:extLst>
+              <a:ext uri="{28A0092B-C50C-407E-A947-70E740481C1C}">
+                <a14:useLocalDpi xmlns:a14="http://schemas.microsoft.com/office/drawing/2010/main" val="0"/>
+              </a:ext>
+            </a:extLst>
+          </a:blip>
+          <a:srcRect/>
+          <a:stretch>
+            <a:fillRect/>
+          </a:stretch>
+        </p:blipFill>
+        <p:spPr bwMode="auto">
+          <a:xfrm>
+            <a:off x="2324769" y="1212334"/>
+            <a:ext cx="7542461" cy="4667605"/>
+          </a:xfrm>
+          <a:prstGeom prst="rect">
+            <a:avLst/>
+          </a:prstGeom>
+          <a:noFill/>
+          <a:extLst>
+            <a:ext uri="{909E8E84-426E-40DD-AFC4-6F175D3DCCD1}">
+              <a14:hiddenFill xmlns:a14="http://schemas.microsoft.com/office/drawing/2010/main">
+                <a:solidFill>
+                  <a:srgbClr val="FFFFFF"/>
+                </a:solidFill>
+              </a14:hiddenFill>
+            </a:ext>
+          </a:extLst>
+        </p:spPr>
+      </p:pic>
+      <p:pic>
+        <p:nvPicPr>
+          <p:cNvPr id="7" name="Imagem 6">
+            <a:extLst>
+              <a:ext uri="{FF2B5EF4-FFF2-40B4-BE49-F238E27FC236}">
+                <a16:creationId xmlns:a16="http://schemas.microsoft.com/office/drawing/2014/main" id="{B420FDEF-6E30-46F9-930C-C43E4B49E9FD}"/>
+              </a:ext>
+            </a:extLst>
+          </p:cNvPr>
+          <p:cNvPicPr>
+            <a:picLocks noChangeAspect="1"/>
+          </p:cNvPicPr>
+          <p:nvPr/>
+        </p:nvPicPr>
+        <p:blipFill>
+          <a:blip r:embed="rId3"/>
+          <a:stretch>
+            <a:fillRect/>
+          </a:stretch>
+        </p:blipFill>
+        <p:spPr>
+          <a:xfrm>
+            <a:off x="3682768" y="5984125"/>
+            <a:ext cx="4826461" cy="723404"/>
+          </a:xfrm>
+          <a:prstGeom prst="rect">
+            <a:avLst/>
+          </a:prstGeom>
+        </p:spPr>
+      </p:pic>
+    </p:spTree>
+    <p:extLst>
+      <p:ext uri="{BB962C8B-B14F-4D97-AF65-F5344CB8AC3E}">
+        <p14:creationId xmlns:p14="http://schemas.microsoft.com/office/powerpoint/2010/main" val="3046558325"/>
+      </p:ext>
+    </p:extLst>
+  </p:cSld>
+  <p:clrMapOvr>
+    <a:masterClrMapping/>
+  </p:clrMapOvr>
+</p:sld>
+</file>
+
+<file path=ppt/slides/slide12.xml><?xml version="1.0" encoding="utf-8"?>
+<p:sld xmlns:a="http://schemas.openxmlformats.org/drawingml/2006/main" xmlns:r="http://schemas.openxmlformats.org/officeDocument/2006/relationships" xmlns:p="http://schemas.openxmlformats.org/presentationml/2006/main">
+  <p:cSld>
+    <p:bg>
+      <p:bgPr>
+        <a:solidFill>
+          <a:schemeClr val="bg1"/>
+        </a:solidFill>
+        <a:effectLst/>
+      </p:bgPr>
+    </p:bg>
+    <p:spTree>
+      <p:nvGrpSpPr>
+        <p:cNvPr id="1" name=""/>
+        <p:cNvGrpSpPr/>
+        <p:nvPr/>
+      </p:nvGrpSpPr>
+      <p:grpSpPr>
+        <a:xfrm>
+          <a:off x="0" y="0"/>
+          <a:ext cx="0" cy="0"/>
+          <a:chOff x="0" y="0"/>
+          <a:chExt cx="0" cy="0"/>
+        </a:xfrm>
+      </p:grpSpPr>
+      <p:sp>
+        <p:nvSpPr>
           <p:cNvPr id="71" name="Rectangle 70">
             <a:extLst>
               <a:ext uri="{FF2B5EF4-FFF2-40B4-BE49-F238E27FC236}">
@@ -6545,547 +7086,6 @@
     <p:extLst>
       <p:ext uri="{BB962C8B-B14F-4D97-AF65-F5344CB8AC3E}">
         <p14:creationId xmlns:p14="http://schemas.microsoft.com/office/powerpoint/2010/main" val="3110370112"/>
-      </p:ext>
-    </p:extLst>
-  </p:cSld>
-  <p:clrMapOvr>
-    <a:masterClrMapping/>
-  </p:clrMapOvr>
-</p:sld>
-</file>
-
-<file path=ppt/slides/slide11.xml><?xml version="1.0" encoding="utf-8"?>
-<p:sld xmlns:a="http://schemas.openxmlformats.org/drawingml/2006/main" xmlns:r="http://schemas.openxmlformats.org/officeDocument/2006/relationships" xmlns:p="http://schemas.openxmlformats.org/presentationml/2006/main">
-  <p:cSld>
-    <p:bg>
-      <p:bgPr>
-        <a:solidFill>
-          <a:schemeClr val="bg1"/>
-        </a:solidFill>
-        <a:effectLst/>
-      </p:bgPr>
-    </p:bg>
-    <p:spTree>
-      <p:nvGrpSpPr>
-        <p:cNvPr id="1" name=""/>
-        <p:cNvGrpSpPr/>
-        <p:nvPr/>
-      </p:nvGrpSpPr>
-      <p:grpSpPr>
-        <a:xfrm>
-          <a:off x="0" y="0"/>
-          <a:ext cx="0" cy="0"/>
-          <a:chOff x="0" y="0"/>
-          <a:chExt cx="0" cy="0"/>
-        </a:xfrm>
-      </p:grpSpPr>
-      <p:sp>
-        <p:nvSpPr>
-          <p:cNvPr id="2" name="Título 1">
-            <a:extLst>
-              <a:ext uri="{FF2B5EF4-FFF2-40B4-BE49-F238E27FC236}">
-                <a16:creationId xmlns:a16="http://schemas.microsoft.com/office/drawing/2014/main" id="{83A4A13A-E62D-45BB-9F17-EBB438D6531F}"/>
-              </a:ext>
-            </a:extLst>
-          </p:cNvPr>
-          <p:cNvSpPr>
-            <a:spLocks noGrp="1"/>
-          </p:cNvSpPr>
-          <p:nvPr>
-            <p:ph type="title" idx="4294967295"/>
-          </p:nvPr>
-        </p:nvSpPr>
-        <p:spPr>
-          <a:xfrm>
-            <a:off x="1012031" y="516603"/>
-            <a:ext cx="10167937" cy="1179513"/>
-          </a:xfrm>
-        </p:spPr>
-        <p:txBody>
-          <a:bodyPr/>
-          <a:lstStyle/>
-          <a:p>
-            <a:r>
-              <a:rPr lang="pt-BR" dirty="0">
-                <a:solidFill>
-                  <a:srgbClr val="363636"/>
-                </a:solidFill>
-              </a:rPr>
-              <a:t>Analytics (Rins)</a:t>
-            </a:r>
-          </a:p>
-        </p:txBody>
-      </p:sp>
-      <p:sp>
-        <p:nvSpPr>
-          <p:cNvPr id="4" name="Retângulo 3">
-            <a:extLst>
-              <a:ext uri="{FF2B5EF4-FFF2-40B4-BE49-F238E27FC236}">
-                <a16:creationId xmlns:a16="http://schemas.microsoft.com/office/drawing/2014/main" id="{FFCF9295-937A-4B33-A4CB-5DB7B6A7A527}"/>
-              </a:ext>
-            </a:extLst>
-          </p:cNvPr>
-          <p:cNvSpPr/>
-          <p:nvPr/>
-        </p:nvSpPr>
-        <p:spPr>
-          <a:xfrm>
-            <a:off x="2281650" y="2559596"/>
-            <a:ext cx="2473452" cy="628650"/>
-          </a:xfrm>
-          <a:prstGeom prst="rect">
-            <a:avLst/>
-          </a:prstGeom>
-          <a:solidFill>
-            <a:schemeClr val="accent4">
-              <a:lumMod val="75000"/>
-            </a:schemeClr>
-          </a:solidFill>
-          <a:ln>
-            <a:solidFill>
-              <a:srgbClr val="363636"/>
-            </a:solidFill>
-          </a:ln>
-        </p:spPr>
-        <p:style>
-          <a:lnRef idx="2">
-            <a:schemeClr val="accent1">
-              <a:shade val="50000"/>
-            </a:schemeClr>
-          </a:lnRef>
-          <a:fillRef idx="1">
-            <a:schemeClr val="accent1"/>
-          </a:fillRef>
-          <a:effectRef idx="0">
-            <a:schemeClr val="accent1"/>
-          </a:effectRef>
-          <a:fontRef idx="minor">
-            <a:schemeClr val="lt1"/>
-          </a:fontRef>
-        </p:style>
-        <p:txBody>
-          <a:bodyPr rtlCol="0" anchor="ctr"/>
-          <a:lstStyle/>
-          <a:p>
-            <a:pPr algn="ctr"/>
-            <a:r>
-              <a:rPr lang="pt-BR" sz="2400" b="1" dirty="0">
-                <a:solidFill>
-                  <a:schemeClr val="tx2"/>
-                </a:solidFill>
-              </a:rPr>
-              <a:t>Crítico</a:t>
-            </a:r>
-          </a:p>
-        </p:txBody>
-      </p:sp>
-      <p:sp>
-        <p:nvSpPr>
-          <p:cNvPr id="6" name="Retângulo 5">
-            <a:extLst>
-              <a:ext uri="{FF2B5EF4-FFF2-40B4-BE49-F238E27FC236}">
-                <a16:creationId xmlns:a16="http://schemas.microsoft.com/office/drawing/2014/main" id="{42DE3707-45C7-4B26-BBC1-B6AD526682F9}"/>
-              </a:ext>
-            </a:extLst>
-          </p:cNvPr>
-          <p:cNvSpPr/>
-          <p:nvPr/>
-        </p:nvSpPr>
-        <p:spPr>
-          <a:xfrm>
-            <a:off x="4755102" y="2559596"/>
-            <a:ext cx="2473452" cy="628650"/>
-          </a:xfrm>
-          <a:prstGeom prst="rect">
-            <a:avLst/>
-          </a:prstGeom>
-          <a:solidFill>
-            <a:srgbClr val="FFFF00"/>
-          </a:solidFill>
-          <a:ln>
-            <a:solidFill>
-              <a:srgbClr val="363636"/>
-            </a:solidFill>
-          </a:ln>
-        </p:spPr>
-        <p:style>
-          <a:lnRef idx="2">
-            <a:schemeClr val="accent1">
-              <a:shade val="50000"/>
-            </a:schemeClr>
-          </a:lnRef>
-          <a:fillRef idx="1">
-            <a:schemeClr val="accent1"/>
-          </a:fillRef>
-          <a:effectRef idx="0">
-            <a:schemeClr val="accent1"/>
-          </a:effectRef>
-          <a:fontRef idx="minor">
-            <a:schemeClr val="lt1"/>
-          </a:fontRef>
-        </p:style>
-        <p:txBody>
-          <a:bodyPr rtlCol="0" anchor="ctr"/>
-          <a:lstStyle/>
-          <a:p>
-            <a:pPr algn="ctr"/>
-            <a:r>
-              <a:rPr lang="pt-BR" sz="2400" b="1" dirty="0">
-                <a:solidFill>
-                  <a:schemeClr val="tx2"/>
-                </a:solidFill>
-              </a:rPr>
-              <a:t>Alerta</a:t>
-            </a:r>
-          </a:p>
-        </p:txBody>
-      </p:sp>
-      <p:sp>
-        <p:nvSpPr>
-          <p:cNvPr id="8" name="Retângulo 7">
-            <a:extLst>
-              <a:ext uri="{FF2B5EF4-FFF2-40B4-BE49-F238E27FC236}">
-                <a16:creationId xmlns:a16="http://schemas.microsoft.com/office/drawing/2014/main" id="{534753E8-DC08-4D85-8E76-1DD10976FC2F}"/>
-              </a:ext>
-            </a:extLst>
-          </p:cNvPr>
-          <p:cNvSpPr/>
-          <p:nvPr/>
-        </p:nvSpPr>
-        <p:spPr>
-          <a:xfrm>
-            <a:off x="7228554" y="2559596"/>
-            <a:ext cx="2473452" cy="628650"/>
-          </a:xfrm>
-          <a:prstGeom prst="rect">
-            <a:avLst/>
-          </a:prstGeom>
-          <a:solidFill>
-            <a:srgbClr val="92D050"/>
-          </a:solidFill>
-          <a:ln>
-            <a:solidFill>
-              <a:srgbClr val="363636"/>
-            </a:solidFill>
-          </a:ln>
-        </p:spPr>
-        <p:style>
-          <a:lnRef idx="2">
-            <a:schemeClr val="accent1">
-              <a:shade val="50000"/>
-            </a:schemeClr>
-          </a:lnRef>
-          <a:fillRef idx="1">
-            <a:schemeClr val="accent1"/>
-          </a:fillRef>
-          <a:effectRef idx="0">
-            <a:schemeClr val="accent1"/>
-          </a:effectRef>
-          <a:fontRef idx="minor">
-            <a:schemeClr val="lt1"/>
-          </a:fontRef>
-        </p:style>
-        <p:txBody>
-          <a:bodyPr rtlCol="0" anchor="ctr"/>
-          <a:lstStyle/>
-          <a:p>
-            <a:pPr algn="ctr"/>
-            <a:r>
-              <a:rPr lang="pt-BR" sz="2400" b="1" dirty="0">
-                <a:solidFill>
-                  <a:schemeClr val="tx2"/>
-                </a:solidFill>
-              </a:rPr>
-              <a:t>Ideal</a:t>
-            </a:r>
-          </a:p>
-        </p:txBody>
-      </p:sp>
-      <p:sp>
-        <p:nvSpPr>
-          <p:cNvPr id="9" name="CaixaDeTexto 8">
-            <a:extLst>
-              <a:ext uri="{FF2B5EF4-FFF2-40B4-BE49-F238E27FC236}">
-                <a16:creationId xmlns:a16="http://schemas.microsoft.com/office/drawing/2014/main" id="{33B73398-4E20-4CFE-81A3-DA32E33E0BB7}"/>
-              </a:ext>
-            </a:extLst>
-          </p:cNvPr>
-          <p:cNvSpPr txBox="1"/>
-          <p:nvPr/>
-        </p:nvSpPr>
-        <p:spPr>
-          <a:xfrm>
-            <a:off x="2281650" y="3188246"/>
-            <a:ext cx="2473452" cy="1815882"/>
-          </a:xfrm>
-          <a:prstGeom prst="rect">
-            <a:avLst/>
-          </a:prstGeom>
-          <a:noFill/>
-        </p:spPr>
-        <p:txBody>
-          <a:bodyPr wrap="square" rtlCol="0">
-            <a:spAutoFit/>
-          </a:bodyPr>
-          <a:lstStyle/>
-          <a:p>
-            <a:pPr marL="285750" indent="-285750">
-              <a:buFont typeface="Arial" panose="020B0604020202020204" pitchFamily="34" charset="0"/>
-              <a:buChar char="•"/>
-            </a:pPr>
-            <a:r>
-              <a:rPr lang="pt-BR" sz="1600" dirty="0">
-                <a:solidFill>
-                  <a:schemeClr val="tx2"/>
-                </a:solidFill>
-              </a:rPr>
-              <a:t>Armazenamento de órgão em risco com perda acelerada da capacidade isotérmica da caixa (temperaturas como 1,5ºC ou 7,4ºC)</a:t>
-            </a:r>
-          </a:p>
-        </p:txBody>
-      </p:sp>
-      <p:sp>
-        <p:nvSpPr>
-          <p:cNvPr id="11" name="CaixaDeTexto 10">
-            <a:extLst>
-              <a:ext uri="{FF2B5EF4-FFF2-40B4-BE49-F238E27FC236}">
-                <a16:creationId xmlns:a16="http://schemas.microsoft.com/office/drawing/2014/main" id="{5E997853-8083-4277-B5EA-6F7F3CAB3191}"/>
-              </a:ext>
-            </a:extLst>
-          </p:cNvPr>
-          <p:cNvSpPr txBox="1"/>
-          <p:nvPr/>
-        </p:nvSpPr>
-        <p:spPr>
-          <a:xfrm>
-            <a:off x="4755102" y="3169136"/>
-            <a:ext cx="2473452" cy="2062103"/>
-          </a:xfrm>
-          <a:prstGeom prst="rect">
-            <a:avLst/>
-          </a:prstGeom>
-          <a:noFill/>
-        </p:spPr>
-        <p:txBody>
-          <a:bodyPr wrap="square" rtlCol="0">
-            <a:spAutoFit/>
-          </a:bodyPr>
-          <a:lstStyle/>
-          <a:p>
-            <a:pPr marL="285750" indent="-285750">
-              <a:buFont typeface="Arial" panose="020B0604020202020204" pitchFamily="34" charset="0"/>
-              <a:buChar char="•"/>
-            </a:pPr>
-            <a:r>
-              <a:rPr lang="pt-BR" sz="1600" dirty="0">
-                <a:solidFill>
-                  <a:schemeClr val="tx2"/>
-                </a:solidFill>
-              </a:rPr>
-              <a:t>Armazenamento de órgão em fase de atenção com risco de perda da capacidade isotérmica da caixa (temperaturas como 2,2ºC ou 5,6ºC)</a:t>
-            </a:r>
-          </a:p>
-        </p:txBody>
-      </p:sp>
-      <p:sp>
-        <p:nvSpPr>
-          <p:cNvPr id="13" name="CaixaDeTexto 12">
-            <a:extLst>
-              <a:ext uri="{FF2B5EF4-FFF2-40B4-BE49-F238E27FC236}">
-                <a16:creationId xmlns:a16="http://schemas.microsoft.com/office/drawing/2014/main" id="{FB2CADAA-0C0B-4B16-A153-F1F523288EAB}"/>
-              </a:ext>
-            </a:extLst>
-          </p:cNvPr>
-          <p:cNvSpPr txBox="1"/>
-          <p:nvPr/>
-        </p:nvSpPr>
-        <p:spPr>
-          <a:xfrm>
-            <a:off x="7228554" y="3169135"/>
-            <a:ext cx="2473452" cy="1815882"/>
-          </a:xfrm>
-          <a:prstGeom prst="rect">
-            <a:avLst/>
-          </a:prstGeom>
-          <a:noFill/>
-        </p:spPr>
-        <p:txBody>
-          <a:bodyPr wrap="square" rtlCol="0">
-            <a:spAutoFit/>
-          </a:bodyPr>
-          <a:lstStyle/>
-          <a:p>
-            <a:pPr marL="285750" indent="-285750">
-              <a:buFont typeface="Arial" panose="020B0604020202020204" pitchFamily="34" charset="0"/>
-              <a:buChar char="•"/>
-            </a:pPr>
-            <a:r>
-              <a:rPr lang="pt-BR" sz="1600" dirty="0">
-                <a:solidFill>
-                  <a:schemeClr val="tx2"/>
-                </a:solidFill>
-              </a:rPr>
-              <a:t>Armazenamento de órgão em fase ideal, sem risco de perda da capacidade isotérmica da caixa, mantendo-se entre 3,5ºC e 4ºC</a:t>
-            </a:r>
-          </a:p>
-        </p:txBody>
-      </p:sp>
-    </p:spTree>
-    <p:extLst>
-      <p:ext uri="{BB962C8B-B14F-4D97-AF65-F5344CB8AC3E}">
-        <p14:creationId xmlns:p14="http://schemas.microsoft.com/office/powerpoint/2010/main" val="2943371185"/>
-      </p:ext>
-    </p:extLst>
-  </p:cSld>
-  <p:clrMapOvr>
-    <a:masterClrMapping/>
-  </p:clrMapOvr>
-</p:sld>
-</file>
-
-<file path=ppt/slides/slide12.xml><?xml version="1.0" encoding="utf-8"?>
-<p:sld xmlns:a="http://schemas.openxmlformats.org/drawingml/2006/main" xmlns:r="http://schemas.openxmlformats.org/officeDocument/2006/relationships" xmlns:p="http://schemas.openxmlformats.org/presentationml/2006/main">
-  <p:cSld>
-    <p:bg>
-      <p:bgPr>
-        <a:solidFill>
-          <a:schemeClr val="bg1"/>
-        </a:solidFill>
-        <a:effectLst/>
-      </p:bgPr>
-    </p:bg>
-    <p:spTree>
-      <p:nvGrpSpPr>
-        <p:cNvPr id="1" name=""/>
-        <p:cNvGrpSpPr/>
-        <p:nvPr/>
-      </p:nvGrpSpPr>
-      <p:grpSpPr>
-        <a:xfrm>
-          <a:off x="0" y="0"/>
-          <a:ext cx="0" cy="0"/>
-          <a:chOff x="0" y="0"/>
-          <a:chExt cx="0" cy="0"/>
-        </a:xfrm>
-      </p:grpSpPr>
-      <p:sp>
-        <p:nvSpPr>
-          <p:cNvPr id="2" name="Título 1">
-            <a:extLst>
-              <a:ext uri="{FF2B5EF4-FFF2-40B4-BE49-F238E27FC236}">
-                <a16:creationId xmlns:a16="http://schemas.microsoft.com/office/drawing/2014/main" id="{83A4A13A-E62D-45BB-9F17-EBB438D6531F}"/>
-              </a:ext>
-            </a:extLst>
-          </p:cNvPr>
-          <p:cNvSpPr>
-            <a:spLocks noGrp="1"/>
-          </p:cNvSpPr>
-          <p:nvPr>
-            <p:ph type="title" idx="4294967295"/>
-          </p:nvPr>
-        </p:nvSpPr>
-        <p:spPr>
-          <a:xfrm>
-            <a:off x="1012031" y="273111"/>
-            <a:ext cx="10167937" cy="1179513"/>
-          </a:xfrm>
-        </p:spPr>
-        <p:txBody>
-          <a:bodyPr/>
-          <a:lstStyle/>
-          <a:p>
-            <a:r>
-              <a:rPr lang="pt-BR" dirty="0">
-                <a:solidFill>
-                  <a:srgbClr val="363636"/>
-                </a:solidFill>
-              </a:rPr>
-              <a:t>Analytics (Rins)</a:t>
-            </a:r>
-          </a:p>
-        </p:txBody>
-      </p:sp>
-      <p:pic>
-        <p:nvPicPr>
-          <p:cNvPr id="3" name="Picture 4">
-            <a:extLst>
-              <a:ext uri="{FF2B5EF4-FFF2-40B4-BE49-F238E27FC236}">
-                <a16:creationId xmlns:a16="http://schemas.microsoft.com/office/drawing/2014/main" id="{AD197701-38AD-42DE-921C-A28C0136A7D0}"/>
-              </a:ext>
-            </a:extLst>
-          </p:cNvPr>
-          <p:cNvPicPr>
-            <a:picLocks noChangeAspect="1" noChangeArrowheads="1"/>
-          </p:cNvPicPr>
-          <p:nvPr/>
-        </p:nvPicPr>
-        <p:blipFill>
-          <a:blip r:embed="rId2">
-            <a:extLst>
-              <a:ext uri="{28A0092B-C50C-407E-A947-70E740481C1C}">
-                <a14:useLocalDpi xmlns:a14="http://schemas.microsoft.com/office/drawing/2010/main" val="0"/>
-              </a:ext>
-            </a:extLst>
-          </a:blip>
-          <a:srcRect/>
-          <a:stretch>
-            <a:fillRect/>
-          </a:stretch>
-        </p:blipFill>
-        <p:spPr bwMode="auto">
-          <a:xfrm>
-            <a:off x="2324769" y="1212334"/>
-            <a:ext cx="7542461" cy="4667605"/>
-          </a:xfrm>
-          <a:prstGeom prst="rect">
-            <a:avLst/>
-          </a:prstGeom>
-          <a:noFill/>
-          <a:extLst>
-            <a:ext uri="{909E8E84-426E-40DD-AFC4-6F175D3DCCD1}">
-              <a14:hiddenFill xmlns:a14="http://schemas.microsoft.com/office/drawing/2010/main">
-                <a:solidFill>
-                  <a:srgbClr val="FFFFFF"/>
-                </a:solidFill>
-              </a14:hiddenFill>
-            </a:ext>
-          </a:extLst>
-        </p:spPr>
-      </p:pic>
-      <p:pic>
-        <p:nvPicPr>
-          <p:cNvPr id="7" name="Imagem 6">
-            <a:extLst>
-              <a:ext uri="{FF2B5EF4-FFF2-40B4-BE49-F238E27FC236}">
-                <a16:creationId xmlns:a16="http://schemas.microsoft.com/office/drawing/2014/main" id="{B420FDEF-6E30-46F9-930C-C43E4B49E9FD}"/>
-              </a:ext>
-            </a:extLst>
-          </p:cNvPr>
-          <p:cNvPicPr>
-            <a:picLocks noChangeAspect="1"/>
-          </p:cNvPicPr>
-          <p:nvPr/>
-        </p:nvPicPr>
-        <p:blipFill>
-          <a:blip r:embed="rId3"/>
-          <a:stretch>
-            <a:fillRect/>
-          </a:stretch>
-        </p:blipFill>
-        <p:spPr>
-          <a:xfrm>
-            <a:off x="3682768" y="5984125"/>
-            <a:ext cx="4826461" cy="723404"/>
-          </a:xfrm>
-          <a:prstGeom prst="rect">
-            <a:avLst/>
-          </a:prstGeom>
-        </p:spPr>
-      </p:pic>
-    </p:spTree>
-    <p:extLst>
-      <p:ext uri="{BB962C8B-B14F-4D97-AF65-F5344CB8AC3E}">
-        <p14:creationId xmlns:p14="http://schemas.microsoft.com/office/powerpoint/2010/main" val="3046558325"/>
       </p:ext>
     </p:extLst>
   </p:cSld>

</xml_diff>

<commit_message>
atualização site & arrumando slide
</commit_message>
<xml_diff>
--- a/Slides/Apresentação.pptx
+++ b/Slides/Apresentação.pptx
@@ -281,7 +281,7 @@
           <a:p>
             <a:fld id="{02AC24A9-CCB6-4F8D-B8DB-C2F3692CFA5A}" type="datetimeFigureOut">
               <a:rPr lang="en-US" smtClean="0"/>
-              <a:t>10/28/2020</a:t>
+              <a:t>10/29/2020</a:t>
             </a:fld>
             <a:endParaRPr lang="en-US" dirty="0"/>
           </a:p>
@@ -651,7 +651,7 @@
           <a:p>
             <a:fld id="{02AC24A9-CCB6-4F8D-B8DB-C2F3692CFA5A}" type="datetimeFigureOut">
               <a:rPr lang="en-US" smtClean="0"/>
-              <a:t>10/28/2020</a:t>
+              <a:t>10/29/2020</a:t>
             </a:fld>
             <a:endParaRPr lang="en-US"/>
           </a:p>
@@ -860,7 +860,7 @@
           <a:p>
             <a:fld id="{02AC24A9-CCB6-4F8D-B8DB-C2F3692CFA5A}" type="datetimeFigureOut">
               <a:rPr lang="en-US" smtClean="0"/>
-              <a:t>10/28/2020</a:t>
+              <a:t>10/29/2020</a:t>
             </a:fld>
             <a:endParaRPr lang="en-US"/>
           </a:p>
@@ -1330,7 +1330,7 @@
           <a:p>
             <a:fld id="{02AC24A9-CCB6-4F8D-B8DB-C2F3692CFA5A}" type="datetimeFigureOut">
               <a:rPr lang="en-US" smtClean="0"/>
-              <a:t>10/28/2020</a:t>
+              <a:t>10/29/2020</a:t>
             </a:fld>
             <a:endParaRPr lang="en-US"/>
           </a:p>
@@ -1784,7 +1784,7 @@
           <a:p>
             <a:fld id="{02AC24A9-CCB6-4F8D-B8DB-C2F3692CFA5A}" type="datetimeFigureOut">
               <a:rPr lang="en-US" smtClean="0"/>
-              <a:t>10/28/2020</a:t>
+              <a:t>10/29/2020</a:t>
             </a:fld>
             <a:endParaRPr lang="en-US"/>
           </a:p>
@@ -2316,7 +2316,7 @@
           <a:p>
             <a:fld id="{02AC24A9-CCB6-4F8D-B8DB-C2F3692CFA5A}" type="datetimeFigureOut">
               <a:rPr lang="en-US" smtClean="0"/>
-              <a:t>10/28/2020</a:t>
+              <a:t>10/29/2020</a:t>
             </a:fld>
             <a:endParaRPr lang="en-US"/>
           </a:p>
@@ -3015,7 +3015,7 @@
           <a:p>
             <a:fld id="{02AC24A9-CCB6-4F8D-B8DB-C2F3692CFA5A}" type="datetimeFigureOut">
               <a:rPr lang="en-US" smtClean="0"/>
-              <a:t>10/28/2020</a:t>
+              <a:t>10/29/2020</a:t>
             </a:fld>
             <a:endParaRPr lang="en-US"/>
           </a:p>
@@ -3344,7 +3344,7 @@
           <a:p>
             <a:fld id="{02AC24A9-CCB6-4F8D-B8DB-C2F3692CFA5A}" type="datetimeFigureOut">
               <a:rPr lang="en-US" smtClean="0"/>
-              <a:t>10/28/2020</a:t>
+              <a:t>10/29/2020</a:t>
             </a:fld>
             <a:endParaRPr lang="en-US"/>
           </a:p>
@@ -3457,7 +3457,7 @@
           <a:p>
             <a:fld id="{02AC24A9-CCB6-4F8D-B8DB-C2F3692CFA5A}" type="datetimeFigureOut">
               <a:rPr lang="en-US" smtClean="0"/>
-              <a:t>10/28/2020</a:t>
+              <a:t>10/29/2020</a:t>
             </a:fld>
             <a:endParaRPr lang="en-US"/>
           </a:p>
@@ -3952,7 +3952,7 @@
           <a:p>
             <a:fld id="{02AC24A9-CCB6-4F8D-B8DB-C2F3692CFA5A}" type="datetimeFigureOut">
               <a:rPr lang="en-US" smtClean="0"/>
-              <a:t>10/28/2020</a:t>
+              <a:t>10/29/2020</a:t>
             </a:fld>
             <a:endParaRPr lang="en-US" dirty="0"/>
           </a:p>
@@ -4429,7 +4429,7 @@
           <a:p>
             <a:fld id="{02AC24A9-CCB6-4F8D-B8DB-C2F3692CFA5A}" type="datetimeFigureOut">
               <a:rPr lang="en-US" smtClean="0"/>
-              <a:t>10/28/2020</a:t>
+              <a:t>10/29/2020</a:t>
             </a:fld>
             <a:endParaRPr lang="en-US"/>
           </a:p>
@@ -4672,7 +4672,7 @@
           <a:p>
             <a:fld id="{02AC24A9-CCB6-4F8D-B8DB-C2F3692CFA5A}" type="datetimeFigureOut">
               <a:rPr lang="en-US" smtClean="0"/>
-              <a:t>10/28/2020</a:t>
+              <a:t>10/29/2020</a:t>
             </a:fld>
             <a:endParaRPr lang="en-US"/>
           </a:p>
@@ -11921,7 +11921,7 @@
         </p:nvSpPr>
         <p:spPr>
           <a:xfrm>
-            <a:off x="5325532" y="1103788"/>
+            <a:off x="5527525" y="1103768"/>
             <a:ext cx="1179333" cy="276999"/>
           </a:xfrm>
           <a:prstGeom prst="rect">
@@ -14069,9 +14069,26 @@
           <a:lstStyle/>
           <a:p>
             <a:r>
-              <a:rPr lang="en-US" sz="4800"/>
-              <a:t>Tabelas e Modelos de dados lógico</a:t>
+              <a:rPr lang="en-US" sz="4800" dirty="0" err="1"/>
+              <a:t>Tabelas</a:t>
             </a:r>
+            <a:r>
+              <a:rPr lang="en-US" sz="4800" dirty="0"/>
+              <a:t> e </a:t>
+            </a:r>
+            <a:r>
+              <a:rPr lang="en-US" sz="4800" dirty="0" err="1"/>
+              <a:t>Modelo</a:t>
+            </a:r>
+            <a:r>
+              <a:rPr lang="en-US" sz="4800" dirty="0"/>
+              <a:t> de dados </a:t>
+            </a:r>
+            <a:r>
+              <a:rPr lang="en-US" sz="4800" dirty="0" err="1"/>
+              <a:t>lógico</a:t>
+            </a:r>
+            <a:endParaRPr lang="en-US" sz="4800" dirty="0"/>
           </a:p>
         </p:txBody>
       </p:sp>
@@ -14850,7 +14867,7 @@
         </p:blipFill>
         <p:spPr>
           <a:xfrm>
-            <a:off x="1219199" y="2139484"/>
+            <a:off x="1219199" y="2135805"/>
             <a:ext cx="9753602" cy="4096512"/>
           </a:xfrm>
           <a:prstGeom prst="rect">

</xml_diff>